<commit_message>
Update ICRA 2025 Banners
</commit_message>
<xml_diff>
--- a/graphics/Competition Banners/F1TENTH Sim Racing @ ICRA 2025.pptx
+++ b/graphics/Competition Banners/F1TENTH Sim Racing @ ICRA 2025.pptx
@@ -3469,7 +3469,7 @@
                   <a:ea typeface="Open Sans" panose="020B0606030504020204" pitchFamily="34" charset="0"/>
                   <a:cs typeface="Open Sans" panose="020B0606030504020204" pitchFamily="34" charset="0"/>
                 </a:rPr>
-                <a:t>2</a:t>
+                <a:t>3</a:t>
               </a:r>
               <a:r>
                 <a:rPr lang="en-US" sz="7200" b="1" i="1" baseline="30000" dirty="0">
@@ -3490,7 +3490,28 @@
                   <a:ea typeface="Open Sans" panose="020B0606030504020204" pitchFamily="34" charset="0"/>
                   <a:cs typeface="Open Sans" panose="020B0606030504020204" pitchFamily="34" charset="0"/>
                 </a:rPr>
-                <a:t> nd</a:t>
+                <a:t> </a:t>
+              </a:r>
+              <a:r>
+                <a:rPr lang="en-US" sz="7200" b="1" i="1" baseline="30000" dirty="0" err="1">
+                  <a:ln w="19050">
+                    <a:solidFill>
+                      <a:schemeClr val="bg1"/>
+                    </a:solidFill>
+                  </a:ln>
+                  <a:noFill/>
+                  <a:effectLst>
+                    <a:glow rad="203200">
+                      <a:schemeClr val="tx1">
+                        <a:alpha val="40000"/>
+                      </a:schemeClr>
+                    </a:glow>
+                  </a:effectLst>
+                  <a:latin typeface="Agency FB" panose="020B0503020202020204" pitchFamily="34" charset="0"/>
+                  <a:ea typeface="Open Sans" panose="020B0606030504020204" pitchFamily="34" charset="0"/>
+                  <a:cs typeface="Open Sans" panose="020B0606030504020204" pitchFamily="34" charset="0"/>
+                </a:rPr>
+                <a:t>rd</a:t>
               </a:r>
               <a:r>
                 <a:rPr lang="en-US" sz="7200" b="1" i="1" dirty="0">
@@ -3839,7 +3860,7 @@
                   <a:ea typeface="Open Sans" panose="020B0606030504020204" pitchFamily="34" charset="0"/>
                   <a:cs typeface="Open Sans" panose="020B0606030504020204" pitchFamily="34" charset="0"/>
                 </a:rPr>
-                <a:t>2</a:t>
+                <a:t>3</a:t>
               </a:r>
               <a:r>
                 <a:rPr lang="en-US" sz="7200" b="1" i="1" baseline="30000" dirty="0">
@@ -3881,7 +3902,7 @@
                   <a:ea typeface="Open Sans" panose="020B0606030504020204" pitchFamily="34" charset="0"/>
                   <a:cs typeface="Open Sans" panose="020B0606030504020204" pitchFamily="34" charset="0"/>
                 </a:rPr>
-                <a:t>nd</a:t>
+                <a:t>rd</a:t>
               </a:r>
               <a:r>
                 <a:rPr lang="en-US" sz="7200" b="1" i="1" dirty="0">

</xml_diff>